<commit_message>
fixed bug in report
</commit_message>
<xml_diff>
--- a/presentation/final presentation.pptx
+++ b/presentation/final presentation.pptx
@@ -257,7 +257,7 @@
           <a:p>
             <a:fld id="{F8F97566-809D-1D41-A072-62869DBBBF8F}" type="datetimeFigureOut">
               <a:rPr lang="en-US" smtClean="0"/>
-              <a:t>13/11/12</a:t>
+              <a:t>14/11/12</a:t>
             </a:fld>
             <a:endParaRPr lang="en-US"/>
           </a:p>
@@ -423,7 +423,7 @@
           <a:p>
             <a:fld id="{AFB37D51-2A56-6043-B5F3-4DDE38B7A355}" type="datetimeFigureOut">
               <a:rPr lang="en-US" smtClean="0"/>
-              <a:t>13/11/12</a:t>
+              <a:t>14/11/12</a:t>
             </a:fld>
             <a:endParaRPr lang="en-US"/>
           </a:p>
@@ -736,6 +736,90 @@
           <a:bodyPr/>
           <a:lstStyle/>
           <a:p>
+            <a:endParaRPr lang="en-US"/>
+          </a:p>
+        </p:txBody>
+      </p:sp>
+      <p:sp>
+        <p:nvSpPr>
+          <p:cNvPr id="4" name="Slide Number Placeholder 3"/>
+          <p:cNvSpPr>
+            <a:spLocks noGrp="1"/>
+          </p:cNvSpPr>
+          <p:nvPr>
+            <p:ph type="sldNum" sz="quarter" idx="10"/>
+          </p:nvPr>
+        </p:nvSpPr>
+        <p:spPr/>
+        <p:txBody>
+          <a:bodyPr/>
+          <a:lstStyle/>
+          <a:p>
+            <a:fld id="{44716C6F-C5DE-E54D-88DA-E0E6B09914EB}" type="slidenum">
+              <a:rPr lang="en-US" smtClean="0"/>
+              <a:t>1</a:t>
+            </a:fld>
+            <a:endParaRPr lang="en-US"/>
+          </a:p>
+        </p:txBody>
+      </p:sp>
+    </p:spTree>
+    <p:extLst>
+      <p:ext uri="{BB962C8B-B14F-4D97-AF65-F5344CB8AC3E}">
+        <p14:creationId xmlns:p14="http://schemas.microsoft.com/office/powerpoint/2010/main" val="3915575743"/>
+      </p:ext>
+    </p:extLst>
+  </p:cSld>
+  <p:clrMapOvr>
+    <a:masterClrMapping/>
+  </p:clrMapOvr>
+</p:notes>
+</file>
+
+<file path=ppt/notesSlides/notesSlide2.xml><?xml version="1.0" encoding="utf-8"?>
+<p:notes xmlns:a="http://schemas.openxmlformats.org/drawingml/2006/main" xmlns:r="http://schemas.openxmlformats.org/officeDocument/2006/relationships" xmlns:p="http://schemas.openxmlformats.org/presentationml/2006/main">
+  <p:cSld>
+    <p:spTree>
+      <p:nvGrpSpPr>
+        <p:cNvPr id="1" name=""/>
+        <p:cNvGrpSpPr/>
+        <p:nvPr/>
+      </p:nvGrpSpPr>
+      <p:grpSpPr>
+        <a:xfrm>
+          <a:off x="0" y="0"/>
+          <a:ext cx="0" cy="0"/>
+          <a:chOff x="0" y="0"/>
+          <a:chExt cx="0" cy="0"/>
+        </a:xfrm>
+      </p:grpSpPr>
+      <p:sp>
+        <p:nvSpPr>
+          <p:cNvPr id="2" name="Slide Image Placeholder 1"/>
+          <p:cNvSpPr>
+            <a:spLocks noGrp="1" noRot="1" noChangeAspect="1"/>
+          </p:cNvSpPr>
+          <p:nvPr>
+            <p:ph type="sldImg"/>
+          </p:nvPr>
+        </p:nvSpPr>
+        <p:spPr/>
+      </p:sp>
+      <p:sp>
+        <p:nvSpPr>
+          <p:cNvPr id="3" name="Notes Placeholder 2"/>
+          <p:cNvSpPr>
+            <a:spLocks noGrp="1"/>
+          </p:cNvSpPr>
+          <p:nvPr>
+            <p:ph type="body" idx="1"/>
+          </p:nvPr>
+        </p:nvSpPr>
+        <p:spPr/>
+        <p:txBody>
+          <a:bodyPr/>
+          <a:lstStyle/>
+          <a:p>
             <a:r>
               <a:rPr lang="en-US" dirty="0" smtClean="0"/>
               <a:t>This observations apply</a:t>
@@ -1005,7 +1089,7 @@
           <a:p>
             <a:fld id="{92B7DB31-0F52-AA49-9534-D8ABD0D278BC}" type="datetime1">
               <a:rPr lang="en-SG" smtClean="0"/>
-              <a:t>13/11/12</a:t>
+              <a:t>14/11/12</a:t>
             </a:fld>
             <a:endParaRPr lang="en-US"/>
           </a:p>
@@ -1337,7 +1421,7 @@
           <a:p>
             <a:fld id="{53AFFC32-EBE6-5946-8C6D-E2587D0E4A44}" type="datetime1">
               <a:rPr lang="en-SG" smtClean="0"/>
-              <a:t>13/11/12</a:t>
+              <a:t>14/11/12</a:t>
             </a:fld>
             <a:endParaRPr lang="en-US"/>
           </a:p>
@@ -1669,7 +1753,7 @@
           <a:p>
             <a:fld id="{5DEBF99A-6777-474F-8EA7-7009D71BE63F}" type="datetime1">
               <a:rPr lang="en-SG" smtClean="0"/>
-              <a:t>13/11/12</a:t>
+              <a:t>14/11/12</a:t>
             </a:fld>
             <a:endParaRPr lang="en-US"/>
           </a:p>
@@ -2001,7 +2085,7 @@
           <a:p>
             <a:fld id="{3570192A-03BC-CD4E-9047-E5C48EB04CF9}" type="datetime1">
               <a:rPr lang="en-SG" smtClean="0"/>
-              <a:t>13/11/12</a:t>
+              <a:t>14/11/12</a:t>
             </a:fld>
             <a:endParaRPr lang="en-US"/>
           </a:p>
@@ -2690,7 +2774,7 @@
           <a:p>
             <a:fld id="{14FEEF1B-67A4-0F4E-BFF4-3EDC5FCA1F05}" type="datetime1">
               <a:rPr lang="en-SG" smtClean="0"/>
-              <a:t>13/11/12</a:t>
+              <a:t>14/11/12</a:t>
             </a:fld>
             <a:endParaRPr lang="en-US"/>
           </a:p>
@@ -2869,7 +2953,7 @@
           <a:p>
             <a:fld id="{A9AD92DB-CC44-474F-809F-25477388B1D8}" type="datetime1">
               <a:rPr lang="en-SG" smtClean="0"/>
-              <a:t>13/11/12</a:t>
+              <a:t>14/11/12</a:t>
             </a:fld>
             <a:endParaRPr lang="en-US"/>
           </a:p>
@@ -3043,7 +3127,7 @@
           <a:p>
             <a:fld id="{971D902E-52E4-5F4D-9A84-F04B09DBA050}" type="datetime1">
               <a:rPr lang="en-SG" smtClean="0"/>
-              <a:t>13/11/12</a:t>
+              <a:t>14/11/12</a:t>
             </a:fld>
             <a:endParaRPr lang="en-US"/>
           </a:p>
@@ -3291,7 +3375,7 @@
           <a:p>
             <a:fld id="{CE006A75-5923-084C-8BC7-CE399FBA6CBA}" type="datetime1">
               <a:rPr lang="en-SG" smtClean="0"/>
-              <a:t>13/11/12</a:t>
+              <a:t>14/11/12</a:t>
             </a:fld>
             <a:endParaRPr lang="en-US"/>
           </a:p>
@@ -3621,7 +3705,7 @@
           <a:p>
             <a:fld id="{10B0BBCE-74AF-BE4E-A2F5-5D2EAE0452E8}" type="datetime1">
               <a:rPr lang="en-SG" smtClean="0"/>
-              <a:t>13/11/12</a:t>
+              <a:t>14/11/12</a:t>
             </a:fld>
             <a:endParaRPr lang="en-US"/>
           </a:p>
@@ -3913,7 +3997,7 @@
           <a:p>
             <a:fld id="{52DD3F78-11B9-2145-A094-6B9ED48008DD}" type="datetime1">
               <a:rPr lang="en-SG" smtClean="0"/>
-              <a:t>13/11/12</a:t>
+              <a:t>14/11/12</a:t>
             </a:fld>
             <a:endParaRPr lang="en-US"/>
           </a:p>
@@ -4349,7 +4433,7 @@
           <a:p>
             <a:fld id="{C0ED4E70-D94B-9D49-902A-5B23FAE68F2B}" type="datetime1">
               <a:rPr lang="en-SG" smtClean="0"/>
-              <a:t>13/11/12</a:t>
+              <a:t>14/11/12</a:t>
             </a:fld>
             <a:endParaRPr lang="en-US"/>
           </a:p>
@@ -4536,7 +4620,7 @@
           <a:p>
             <a:fld id="{7F340516-AF09-E848-8BB8-1D5E98054DC9}" type="datetime1">
               <a:rPr lang="en-SG" smtClean="0"/>
-              <a:t>13/11/12</a:t>
+              <a:t>14/11/12</a:t>
             </a:fld>
             <a:endParaRPr lang="en-US"/>
           </a:p>
@@ -4626,7 +4710,7 @@
           <a:p>
             <a:fld id="{616317CA-CB22-1C45-A429-436430073183}" type="datetime1">
               <a:rPr lang="en-SG" smtClean="0"/>
-              <a:t>13/11/12</a:t>
+              <a:t>14/11/12</a:t>
             </a:fld>
             <a:endParaRPr lang="en-US"/>
           </a:p>
@@ -4907,7 +4991,7 @@
           <a:p>
             <a:fld id="{D139C871-BD11-7E44-B32D-ED138BB24993}" type="datetime1">
               <a:rPr lang="en-SG" smtClean="0"/>
-              <a:t>13/11/12</a:t>
+              <a:t>14/11/12</a:t>
             </a:fld>
             <a:endParaRPr lang="en-US"/>
           </a:p>
@@ -5122,7 +5206,7 @@
           <a:p>
             <a:fld id="{9699C1BD-4514-A447-905B-86DEC9C58C55}" type="datetime1">
               <a:rPr lang="en-SG" smtClean="0"/>
-              <a:t>13/11/12</a:t>
+              <a:t>14/11/12</a:t>
             </a:fld>
             <a:endParaRPr lang="en-US"/>
           </a:p>
@@ -5675,7 +5759,7 @@
           <a:p>
             <a:fld id="{493E6BDE-0295-4C4B-902B-FD401AACEC02}" type="datetime1">
               <a:rPr lang="en-SG" smtClean="0"/>
-              <a:t>13/11/12</a:t>
+              <a:t>14/11/12</a:t>
             </a:fld>
             <a:endParaRPr lang="en-US"/>
           </a:p>
@@ -5800,7 +5884,7 @@
           <a:p>
             <a:fld id="{971D902E-52E4-5F4D-9A84-F04B09DBA050}" type="datetime1">
               <a:rPr lang="en-SG" smtClean="0"/>
-              <a:t>13/11/12</a:t>
+              <a:t>14/11/12</a:t>
             </a:fld>
             <a:endParaRPr lang="en-US"/>
           </a:p>
@@ -5942,7 +6026,15 @@
             </a:r>
             <a:r>
               <a:rPr lang="en-US" dirty="0" smtClean="0"/>
-              <a:t> (Citing context) [&lt;citation&gt;]</a:t>
+              <a:t> (Citing context) [</a:t>
+            </a:r>
+            <a:r>
+              <a:rPr lang="en-US" dirty="0" err="1" smtClean="0"/>
+              <a:t>Nakov</a:t>
+            </a:r>
+            <a:r>
+              <a:rPr lang="en-US" dirty="0" smtClean="0"/>
+              <a:t> et al, 2004]</a:t>
             </a:r>
           </a:p>
           <a:p>
@@ -5952,8 +6044,17 @@
             </a:pPr>
             <a:r>
               <a:rPr lang="en-US" dirty="0" smtClean="0"/>
-              <a:t>Automatic citation classification</a:t>
-            </a:r>
+              <a:t>Automatic </a:t>
+            </a:r>
+            <a:r>
+              <a:rPr lang="en-US" dirty="0" smtClean="0"/>
+              <a:t>citation </a:t>
+            </a:r>
+            <a:r>
+              <a:rPr lang="en-US" dirty="0" smtClean="0"/>
+              <a:t>classification</a:t>
+            </a:r>
+            <a:endParaRPr lang="en-US" dirty="0" smtClean="0"/>
           </a:p>
           <a:p>
             <a:pPr lvl="1">
@@ -6000,7 +6101,7 @@
           <a:p>
             <a:fld id="{971D902E-52E4-5F4D-9A84-F04B09DBA050}" type="datetime1">
               <a:rPr lang="en-SG" smtClean="0"/>
-              <a:t>13/11/12</a:t>
+              <a:t>14/11/12</a:t>
             </a:fld>
             <a:endParaRPr lang="en-US"/>
           </a:p>
@@ -6085,9 +6186,55 @@
           </a:p>
         </p:txBody>
       </p:sp>
+      <p:sp>
+        <p:nvSpPr>
+          <p:cNvPr id="4" name="Date Placeholder 3"/>
+          <p:cNvSpPr>
+            <a:spLocks noGrp="1"/>
+          </p:cNvSpPr>
+          <p:nvPr>
+            <p:ph type="dt" sz="half" idx="10"/>
+          </p:nvPr>
+        </p:nvSpPr>
+        <p:spPr/>
+        <p:txBody>
+          <a:bodyPr/>
+          <a:lstStyle/>
+          <a:p>
+            <a:fld id="{971D902E-52E4-5F4D-9A84-F04B09DBA050}" type="datetime1">
+              <a:rPr lang="en-SG" smtClean="0"/>
+              <a:t>14/11/12</a:t>
+            </a:fld>
+            <a:endParaRPr lang="en-US"/>
+          </a:p>
+        </p:txBody>
+      </p:sp>
+      <p:sp>
+        <p:nvSpPr>
+          <p:cNvPr id="5" name="Slide Number Placeholder 4"/>
+          <p:cNvSpPr>
+            <a:spLocks noGrp="1"/>
+          </p:cNvSpPr>
+          <p:nvPr>
+            <p:ph type="sldNum" sz="quarter" idx="12"/>
+          </p:nvPr>
+        </p:nvSpPr>
+        <p:spPr/>
+        <p:txBody>
+          <a:bodyPr/>
+          <a:lstStyle/>
+          <a:p>
+            <a:fld id="{9C1F5A0A-F6FC-4FFD-9B49-0DA8697211D9}" type="slidenum">
+              <a:rPr lang="en-US" smtClean="0"/>
+              <a:t>12</a:t>
+            </a:fld>
+            <a:endParaRPr lang="en-US"/>
+          </a:p>
+        </p:txBody>
+      </p:sp>
       <p:pic>
         <p:nvPicPr>
-          <p:cNvPr id="6" name="Content Placeholder 5" descr="Screen Shot 2012-11-09 at 1.24.21 PM.PNG"/>
+          <p:cNvPr id="7" name="Content Placeholder 6" descr="Screen Shot 2012-11-14 at 2.05.58 PM.PNG"/>
           <p:cNvPicPr>
             <a:picLocks noGrp="1" noChangeAspect="1"/>
           </p:cNvPicPr>
@@ -6103,64 +6250,18 @@
               </a:ext>
             </a:extLst>
           </a:blip>
-          <a:srcRect l="-25099" r="-25099"/>
+          <a:srcRect l="-30467" r="-30467"/>
           <a:stretch>
             <a:fillRect/>
           </a:stretch>
         </p:blipFill>
         <p:spPr>
           <a:xfrm>
-            <a:off x="-750832" y="580569"/>
-            <a:ext cx="10543172" cy="5775781"/>
+            <a:off x="-832878" y="329265"/>
+            <a:ext cx="10834128" cy="5935173"/>
           </a:xfrm>
         </p:spPr>
       </p:pic>
-      <p:sp>
-        <p:nvSpPr>
-          <p:cNvPr id="4" name="Date Placeholder 3"/>
-          <p:cNvSpPr>
-            <a:spLocks noGrp="1"/>
-          </p:cNvSpPr>
-          <p:nvPr>
-            <p:ph type="dt" sz="half" idx="10"/>
-          </p:nvPr>
-        </p:nvSpPr>
-        <p:spPr/>
-        <p:txBody>
-          <a:bodyPr/>
-          <a:lstStyle/>
-          <a:p>
-            <a:fld id="{971D902E-52E4-5F4D-9A84-F04B09DBA050}" type="datetime1">
-              <a:rPr lang="en-SG" smtClean="0"/>
-              <a:t>13/11/12</a:t>
-            </a:fld>
-            <a:endParaRPr lang="en-US"/>
-          </a:p>
-        </p:txBody>
-      </p:sp>
-      <p:sp>
-        <p:nvSpPr>
-          <p:cNvPr id="5" name="Slide Number Placeholder 4"/>
-          <p:cNvSpPr>
-            <a:spLocks noGrp="1"/>
-          </p:cNvSpPr>
-          <p:nvPr>
-            <p:ph type="sldNum" sz="quarter" idx="12"/>
-          </p:nvPr>
-        </p:nvSpPr>
-        <p:spPr/>
-        <p:txBody>
-          <a:bodyPr/>
-          <a:lstStyle/>
-          <a:p>
-            <a:fld id="{9C1F5A0A-F6FC-4FFD-9B49-0DA8697211D9}" type="slidenum">
-              <a:rPr lang="en-US" smtClean="0"/>
-              <a:t>12</a:t>
-            </a:fld>
-            <a:endParaRPr lang="en-US"/>
-          </a:p>
-        </p:txBody>
-      </p:sp>
     </p:spTree>
     <p:extLst>
       <p:ext uri="{BB962C8B-B14F-4D97-AF65-F5344CB8AC3E}">
@@ -6323,7 +6424,7 @@
           <a:p>
             <a:fld id="{971D902E-52E4-5F4D-9A84-F04B09DBA050}" type="datetime1">
               <a:rPr lang="en-SG" smtClean="0"/>
-              <a:t>13/11/12</a:t>
+              <a:t>14/11/12</a:t>
             </a:fld>
             <a:endParaRPr lang="en-US"/>
           </a:p>
@@ -6349,6 +6450,36 @@
               <a:t>13</a:t>
             </a:fld>
             <a:endParaRPr lang="en-US"/>
+          </a:p>
+        </p:txBody>
+      </p:sp>
+      <p:sp>
+        <p:nvSpPr>
+          <p:cNvPr id="6" name="TextBox 5"/>
+          <p:cNvSpPr txBox="1"/>
+          <p:nvPr/>
+        </p:nvSpPr>
+        <p:spPr>
+          <a:xfrm>
+            <a:off x="685800" y="5984875"/>
+            <a:ext cx="1712240" cy="369332"/>
+          </a:xfrm>
+          <a:prstGeom prst="rect">
+            <a:avLst/>
+          </a:prstGeom>
+          <a:noFill/>
+        </p:spPr>
+        <p:txBody>
+          <a:bodyPr wrap="none" rtlCol="0">
+            <a:spAutoFit/>
+          </a:bodyPr>
+          <a:lstStyle/>
+          <a:p>
+            <a:r>
+              <a:rPr lang="en-US" dirty="0" smtClean="0"/>
+              <a:t>Wan et al, 2010</a:t>
+            </a:r>
+            <a:endParaRPr lang="en-US" dirty="0"/>
           </a:p>
         </p:txBody>
       </p:sp>
@@ -6484,7 +6615,7 @@
           <a:p>
             <a:fld id="{971D902E-52E4-5F4D-9A84-F04B09DBA050}" type="datetime1">
               <a:rPr lang="en-SG" smtClean="0"/>
-              <a:t>13/11/12</a:t>
+              <a:t>14/11/12</a:t>
             </a:fld>
             <a:endParaRPr lang="en-US"/>
           </a:p>
@@ -6645,7 +6776,7 @@
           <a:p>
             <a:fld id="{971D902E-52E4-5F4D-9A84-F04B09DBA050}" type="datetime1">
               <a:rPr lang="en-SG" smtClean="0"/>
-              <a:t>13/11/12</a:t>
+              <a:t>14/11/12</a:t>
             </a:fld>
             <a:endParaRPr lang="en-US"/>
           </a:p>
@@ -6781,7 +6912,7 @@
           <a:p>
             <a:fld id="{971D902E-52E4-5F4D-9A84-F04B09DBA050}" type="datetime1">
               <a:rPr lang="en-SG" smtClean="0"/>
-              <a:t>13/11/12</a:t>
+              <a:t>14/11/12</a:t>
             </a:fld>
             <a:endParaRPr lang="en-US"/>
           </a:p>
@@ -6906,7 +7037,7 @@
           <a:p>
             <a:fld id="{971D902E-52E4-5F4D-9A84-F04B09DBA050}" type="datetime1">
               <a:rPr lang="en-SG" smtClean="0"/>
-              <a:t>13/11/12</a:t>
+              <a:t>14/11/12</a:t>
             </a:fld>
             <a:endParaRPr lang="en-US"/>
           </a:p>
@@ -7084,7 +7215,7 @@
           <a:p>
             <a:fld id="{971D902E-52E4-5F4D-9A84-F04B09DBA050}" type="datetime1">
               <a:rPr lang="en-SG" smtClean="0"/>
-              <a:t>13/11/12</a:t>
+              <a:t>14/11/12</a:t>
             </a:fld>
             <a:endParaRPr lang="en-US"/>
           </a:p>
@@ -7248,7 +7379,7 @@
           <a:p>
             <a:fld id="{971D902E-52E4-5F4D-9A84-F04B09DBA050}" type="datetime1">
               <a:rPr lang="en-SG" smtClean="0"/>
-              <a:t>13/11/12</a:t>
+              <a:t>14/11/12</a:t>
             </a:fld>
             <a:endParaRPr lang="en-US"/>
           </a:p>
@@ -7374,7 +7505,7 @@
           <a:p>
             <a:fld id="{563E79EE-1F17-1648-97B2-C07F58618625}" type="datetime1">
               <a:rPr lang="en-SG" smtClean="0"/>
-              <a:t>13/11/12</a:t>
+              <a:t>14/11/12</a:t>
             </a:fld>
             <a:endParaRPr lang="en-US"/>
           </a:p>
@@ -7507,7 +7638,7 @@
           <a:p>
             <a:fld id="{971D902E-52E4-5F4D-9A84-F04B09DBA050}" type="datetime1">
               <a:rPr lang="en-SG" smtClean="0"/>
-              <a:t>13/11/12</a:t>
+              <a:t>14/11/12</a:t>
             </a:fld>
             <a:endParaRPr lang="en-US"/>
           </a:p>
@@ -7590,7 +7721,7 @@
           <a:p>
             <a:r>
               <a:rPr lang="en-US" dirty="0" smtClean="0"/>
-              <a:t>General</a:t>
+              <a:t>General Citations</a:t>
             </a:r>
             <a:endParaRPr lang="en-US" dirty="0"/>
           </a:p>
@@ -7666,7 +7797,7 @@
           <a:p>
             <a:fld id="{971D902E-52E4-5F4D-9A84-F04B09DBA050}" type="datetime1">
               <a:rPr lang="en-SG" smtClean="0"/>
-              <a:t>13/11/12</a:t>
+              <a:t>14/11/12</a:t>
             </a:fld>
             <a:endParaRPr lang="en-US"/>
           </a:p>
@@ -7749,7 +7880,7 @@
           <a:p>
             <a:r>
               <a:rPr lang="en-US" dirty="0" smtClean="0"/>
-              <a:t>Specific</a:t>
+              <a:t>Specific Citations</a:t>
             </a:r>
             <a:endParaRPr lang="en-US" dirty="0"/>
           </a:p>
@@ -7845,7 +7976,7 @@
           <a:p>
             <a:fld id="{971D902E-52E4-5F4D-9A84-F04B09DBA050}" type="datetime1">
               <a:rPr lang="en-SG" smtClean="0"/>
-              <a:t>13/11/12</a:t>
+              <a:t>14/11/12</a:t>
             </a:fld>
             <a:endParaRPr lang="en-US"/>
           </a:p>
@@ -7957,11 +8088,7 @@
             </a:pPr>
             <a:r>
               <a:rPr lang="en-US" dirty="0" smtClean="0"/>
-              <a:t>Splittin</a:t>
-            </a:r>
-            <a:r>
-              <a:rPr lang="en-US" dirty="0" smtClean="0"/>
-              <a:t>g the problem into 2 tiers</a:t>
+              <a:t>Splitting the problem into 2 tiers</a:t>
             </a:r>
           </a:p>
           <a:p>
@@ -8066,7 +8193,7 @@
           <a:p>
             <a:fld id="{971D902E-52E4-5F4D-9A84-F04B09DBA050}" type="datetime1">
               <a:rPr lang="en-SG" smtClean="0"/>
-              <a:t>13/11/12</a:t>
+              <a:t>14/11/12</a:t>
             </a:fld>
             <a:endParaRPr lang="en-US"/>
           </a:p>
@@ -8202,7 +8329,7 @@
           <a:p>
             <a:fld id="{971D902E-52E4-5F4D-9A84-F04B09DBA050}" type="datetime1">
               <a:rPr lang="en-SG" smtClean="0"/>
-              <a:t>13/11/12</a:t>
+              <a:t>14/11/12</a:t>
             </a:fld>
             <a:endParaRPr lang="en-US"/>
           </a:p>
@@ -8341,7 +8468,11 @@
               <a:buChar char="•"/>
             </a:pPr>
             <a:r>
-              <a:rPr lang="en-US" dirty="0" smtClean="0"/>
+              <a:rPr lang="en-US" dirty="0" smtClean="0">
+                <a:solidFill>
+                  <a:srgbClr val="FFFFFF"/>
+                </a:solidFill>
+              </a:rPr>
               <a:t>E.g. X98-1031==&gt;X96-1049</a:t>
             </a:r>
           </a:p>
@@ -8351,7 +8482,11 @@
               <a:buChar char="•"/>
             </a:pPr>
             <a:r>
-              <a:rPr lang="en-US" dirty="0" smtClean="0"/>
+              <a:rPr lang="en-US" dirty="0" smtClean="0">
+                <a:solidFill>
+                  <a:srgbClr val="FFFFFF"/>
+                </a:solidFill>
+              </a:rPr>
               <a:t>Citation relationships</a:t>
             </a:r>
           </a:p>
@@ -8385,7 +8520,7 @@
           <a:p>
             <a:fld id="{971D902E-52E4-5F4D-9A84-F04B09DBA050}" type="datetime1">
               <a:rPr lang="en-SG" smtClean="0"/>
-              <a:t>13/11/12</a:t>
+              <a:t>14/11/12</a:t>
             </a:fld>
             <a:endParaRPr lang="en-US"/>
           </a:p>
@@ -8645,7 +8780,7 @@
           <a:p>
             <a:fld id="{971D902E-52E4-5F4D-9A84-F04B09DBA050}" type="datetime1">
               <a:rPr lang="en-SG" smtClean="0"/>
-              <a:t>13/11/12</a:t>
+              <a:t>14/11/12</a:t>
             </a:fld>
             <a:endParaRPr lang="en-US"/>
           </a:p>
@@ -8781,7 +8916,7 @@
           <a:p>
             <a:fld id="{971D902E-52E4-5F4D-9A84-F04B09DBA050}" type="datetime1">
               <a:rPr lang="en-SG" smtClean="0"/>
-              <a:t>13/11/12</a:t>
+              <a:t>14/11/12</a:t>
             </a:fld>
             <a:endParaRPr lang="en-US"/>
           </a:p>
@@ -8897,7 +9032,7 @@
           <a:p>
             <a:fld id="{971D902E-52E4-5F4D-9A84-F04B09DBA050}" type="datetime1">
               <a:rPr lang="en-SG" smtClean="0"/>
-              <a:t>13/11/12</a:t>
+              <a:t>14/11/12</a:t>
             </a:fld>
             <a:endParaRPr lang="en-US"/>
           </a:p>
@@ -9329,7 +9464,7 @@
           <a:p>
             <a:fld id="{971D902E-52E4-5F4D-9A84-F04B09DBA050}" type="datetime1">
               <a:rPr lang="en-SG" smtClean="0"/>
-              <a:t>13/11/12</a:t>
+              <a:t>14/11/12</a:t>
             </a:fld>
             <a:endParaRPr lang="en-US"/>
           </a:p>
@@ -9368,6 +9503,13 @@
   <p:clrMapOvr>
     <a:masterClrMapping/>
   </p:clrMapOvr>
+  <p:timing>
+    <p:tnLst>
+      <p:par>
+        <p:cTn xmlns:p14="http://schemas.microsoft.com/office/powerpoint/2010/main" id="1" dur="indefinite" restart="never" nodeType="tmRoot"/>
+      </p:par>
+    </p:tnLst>
+  </p:timing>
 </p:sld>
 </file>
 
@@ -9439,7 +9581,11 @@
             </a:pPr>
             <a:r>
               <a:rPr lang="en-US" sz="3000" dirty="0" smtClean="0"/>
-              <a:t>Most citations are mere mentions</a:t>
+              <a:t>Most citations are mere </a:t>
+            </a:r>
+            <a:r>
+              <a:rPr lang="en-US" sz="3000" i="1" dirty="0" smtClean="0"/>
+              <a:t>mentions</a:t>
             </a:r>
           </a:p>
           <a:p>
@@ -9474,7 +9620,7 @@
           <a:p>
             <a:fld id="{94B8BBE6-B782-1D40-BFB6-CF71C008F728}" type="datetime1">
               <a:rPr lang="en-SG" smtClean="0"/>
-              <a:t>13/11/12</a:t>
+              <a:t>14/11/12</a:t>
             </a:fld>
             <a:endParaRPr lang="en-US"/>
           </a:p>
@@ -9662,11 +9808,7 @@
             </a:r>
             <a:r>
               <a:rPr lang="en-US" u="sng" dirty="0" smtClean="0"/>
-              <a:t>L50-</a:t>
-            </a:r>
-            <a:r>
-              <a:rPr lang="en-US" u="sng" dirty="0" smtClean="0"/>
-              <a:t>78</a:t>
+              <a:t>L50-78</a:t>
             </a:r>
           </a:p>
           <a:p>
@@ -9678,7 +9820,6 @@
               <a:rPr lang="en-US" dirty="0" smtClean="0"/>
               <a:t>Overlap? Yes. Correct? ????</a:t>
             </a:r>
-            <a:endParaRPr lang="en-US" dirty="0" smtClean="0"/>
           </a:p>
           <a:p>
             <a:pPr>
@@ -9710,7 +9851,7 @@
           <a:p>
             <a:fld id="{971D902E-52E4-5F4D-9A84-F04B09DBA050}" type="datetime1">
               <a:rPr lang="en-SG" smtClean="0"/>
-              <a:t>13/11/12</a:t>
+              <a:t>14/11/12</a:t>
             </a:fld>
             <a:endParaRPr lang="en-US"/>
           </a:p>
@@ -9749,6 +9890,13 @@
   <p:clrMapOvr>
     <a:masterClrMapping/>
   </p:clrMapOvr>
+  <p:timing>
+    <p:tnLst>
+      <p:par>
+        <p:cTn xmlns:p14="http://schemas.microsoft.com/office/powerpoint/2010/main" id="1" dur="indefinite" restart="never" nodeType="tmRoot"/>
+      </p:par>
+    </p:tnLst>
+  </p:timing>
 </p:sld>
 </file>
 
@@ -9819,7 +9967,7 @@
           <a:p>
             <a:fld id="{971D902E-52E4-5F4D-9A84-F04B09DBA050}" type="datetime1">
               <a:rPr lang="en-SG" smtClean="0"/>
-              <a:t>13/11/12</a:t>
+              <a:t>14/11/12</a:t>
             </a:fld>
             <a:endParaRPr lang="en-US"/>
           </a:p>
@@ -10638,7 +10786,7 @@
           <a:p>
             <a:fld id="{971D902E-52E4-5F4D-9A84-F04B09DBA050}" type="datetime1">
               <a:rPr lang="en-SG" smtClean="0"/>
-              <a:t>13/11/12</a:t>
+              <a:t>14/11/12</a:t>
             </a:fld>
             <a:endParaRPr lang="en-US"/>
           </a:p>
@@ -10936,7 +11084,7 @@
           <a:p>
             <a:fld id="{971D902E-52E4-5F4D-9A84-F04B09DBA050}" type="datetime1">
               <a:rPr lang="en-SG" smtClean="0"/>
-              <a:t>13/11/12</a:t>
+              <a:t>14/11/12</a:t>
             </a:fld>
             <a:endParaRPr lang="en-US"/>
           </a:p>
@@ -11238,7 +11386,7 @@
           <a:p>
             <a:fld id="{C0ED4E70-D94B-9D49-902A-5B23FAE68F2B}" type="datetime1">
               <a:rPr lang="en-SG" smtClean="0"/>
-              <a:t>13/11/12</a:t>
+              <a:t>14/11/12</a:t>
             </a:fld>
             <a:endParaRPr lang="en-US"/>
           </a:p>
@@ -11354,7 +11502,7 @@
           <a:p>
             <a:fld id="{971D902E-52E4-5F4D-9A84-F04B09DBA050}" type="datetime1">
               <a:rPr lang="en-SG" smtClean="0"/>
-              <a:t>13/11/12</a:t>
+              <a:t>14/11/12</a:t>
             </a:fld>
             <a:endParaRPr lang="en-US"/>
           </a:p>
@@ -11597,7 +11745,7 @@
           <a:p>
             <a:fld id="{971D902E-52E4-5F4D-9A84-F04B09DBA050}" type="datetime1">
               <a:rPr lang="en-SG" smtClean="0"/>
-              <a:t>13/11/12</a:t>
+              <a:t>14/11/12</a:t>
             </a:fld>
             <a:endParaRPr lang="en-US"/>
           </a:p>
@@ -11803,7 +11951,7 @@
           <a:p>
             <a:fld id="{971D902E-52E4-5F4D-9A84-F04B09DBA050}" type="datetime1">
               <a:rPr lang="en-SG" smtClean="0"/>
-              <a:t>13/11/12</a:t>
+              <a:t>14/11/12</a:t>
             </a:fld>
             <a:endParaRPr lang="en-US"/>
           </a:p>
@@ -11939,7 +12087,7 @@
           <a:p>
             <a:fld id="{971D902E-52E4-5F4D-9A84-F04B09DBA050}" type="datetime1">
               <a:rPr lang="en-SG" smtClean="0"/>
-              <a:t>13/11/12</a:t>
+              <a:t>14/11/12</a:t>
             </a:fld>
             <a:endParaRPr lang="en-US"/>
           </a:p>
@@ -12038,7 +12186,6 @@
               <a:rPr lang="en-US" dirty="0"/>
               <a:t> tier)</a:t>
             </a:r>
-            <a:endParaRPr lang="en-US" dirty="0"/>
           </a:p>
         </p:txBody>
       </p:sp>
@@ -12059,7 +12206,7 @@
           <a:p>
             <a:fld id="{971D902E-52E4-5F4D-9A84-F04B09DBA050}" type="datetime1">
               <a:rPr lang="en-SG" smtClean="0"/>
-              <a:t>13/11/12</a:t>
+              <a:t>14/11/12</a:t>
             </a:fld>
             <a:endParaRPr lang="en-US"/>
           </a:p>
@@ -12335,7 +12482,7 @@
           <a:p>
             <a:fld id="{3C917033-8575-0740-9C34-1A336DB11ACD}" type="datetime1">
               <a:rPr lang="en-SG" smtClean="0"/>
-              <a:t>13/11/12</a:t>
+              <a:t>14/11/12</a:t>
             </a:fld>
             <a:endParaRPr lang="en-US"/>
           </a:p>
@@ -12553,7 +12700,7 @@
           <a:p>
             <a:fld id="{971D902E-52E4-5F4D-9A84-F04B09DBA050}" type="datetime1">
               <a:rPr lang="en-SG" smtClean="0"/>
-              <a:t>13/11/12</a:t>
+              <a:t>14/11/12</a:t>
             </a:fld>
             <a:endParaRPr lang="en-US"/>
           </a:p>
@@ -12753,7 +12900,7 @@
           <a:p>
             <a:fld id="{971D902E-52E4-5F4D-9A84-F04B09DBA050}" type="datetime1">
               <a:rPr lang="en-SG" smtClean="0"/>
-              <a:t>13/11/12</a:t>
+              <a:t>14/11/12</a:t>
             </a:fld>
             <a:endParaRPr lang="en-US"/>
           </a:p>
@@ -12792,6 +12939,13 @@
   <p:clrMapOvr>
     <a:masterClrMapping/>
   </p:clrMapOvr>
+  <p:timing>
+    <p:tnLst>
+      <p:par>
+        <p:cTn xmlns:p14="http://schemas.microsoft.com/office/powerpoint/2010/main" id="1" dur="indefinite" restart="never" nodeType="tmRoot"/>
+      </p:par>
+    </p:tnLst>
+  </p:timing>
 </p:sld>
 </file>
 
@@ -12967,7 +13121,7 @@
           <a:p>
             <a:fld id="{971D902E-52E4-5F4D-9A84-F04B09DBA050}" type="datetime1">
               <a:rPr lang="en-SG" smtClean="0"/>
-              <a:t>13/11/12</a:t>
+              <a:t>14/11/12</a:t>
             </a:fld>
             <a:endParaRPr lang="en-US"/>
           </a:p>
@@ -13006,6 +13160,13 @@
   <p:clrMapOvr>
     <a:masterClrMapping/>
   </p:clrMapOvr>
+  <p:timing>
+    <p:tnLst>
+      <p:par>
+        <p:cTn xmlns:p14="http://schemas.microsoft.com/office/powerpoint/2010/main" id="1" dur="indefinite" restart="never" nodeType="tmRoot"/>
+      </p:par>
+    </p:tnLst>
+  </p:timing>
 </p:sld>
 </file>
 
@@ -13121,7 +13282,7 @@
           <a:p>
             <a:fld id="{971D902E-52E4-5F4D-9A84-F04B09DBA050}" type="datetime1">
               <a:rPr lang="en-SG" smtClean="0"/>
-              <a:t>13/11/12</a:t>
+              <a:t>14/11/12</a:t>
             </a:fld>
             <a:endParaRPr lang="en-US"/>
           </a:p>
@@ -13160,6 +13321,13 @@
   <p:clrMapOvr>
     <a:masterClrMapping/>
   </p:clrMapOvr>
+  <p:timing>
+    <p:tnLst>
+      <p:par>
+        <p:cTn xmlns:p14="http://schemas.microsoft.com/office/powerpoint/2010/main" id="1" dur="indefinite" restart="never" nodeType="tmRoot"/>
+      </p:par>
+    </p:tnLst>
+  </p:timing>
 </p:sld>
 </file>
 
@@ -13281,7 +13449,7 @@
           <a:p>
             <a:fld id="{971D902E-52E4-5F4D-9A84-F04B09DBA050}" type="datetime1">
               <a:rPr lang="en-SG" smtClean="0"/>
-              <a:t>13/11/12</a:t>
+              <a:t>14/11/12</a:t>
             </a:fld>
             <a:endParaRPr lang="en-US"/>
           </a:p>
@@ -13320,6 +13488,13 @@
   <p:clrMapOvr>
     <a:masterClrMapping/>
   </p:clrMapOvr>
+  <p:timing>
+    <p:tnLst>
+      <p:par>
+        <p:cTn xmlns:p14="http://schemas.microsoft.com/office/powerpoint/2010/main" id="1" dur="indefinite" restart="never" nodeType="tmRoot"/>
+      </p:par>
+    </p:tnLst>
+  </p:timing>
 </p:sld>
 </file>
 
@@ -13503,7 +13678,7 @@
           <a:p>
             <a:fld id="{971D902E-52E4-5F4D-9A84-F04B09DBA050}" type="datetime1">
               <a:rPr lang="en-SG" smtClean="0"/>
-              <a:t>13/11/12</a:t>
+              <a:t>14/11/12</a:t>
             </a:fld>
             <a:endParaRPr lang="en-US"/>
           </a:p>
@@ -13542,6 +13717,13 @@
   <p:clrMapOvr>
     <a:masterClrMapping/>
   </p:clrMapOvr>
+  <p:timing>
+    <p:tnLst>
+      <p:par>
+        <p:cTn xmlns:p14="http://schemas.microsoft.com/office/powerpoint/2010/main" id="1" dur="indefinite" restart="never" nodeType="tmRoot"/>
+      </p:par>
+    </p:tnLst>
+  </p:timing>
 </p:sld>
 </file>
 
@@ -13632,7 +13814,7 @@
           <a:p>
             <a:fld id="{971D902E-52E4-5F4D-9A84-F04B09DBA050}" type="datetime1">
               <a:rPr lang="en-SG" smtClean="0"/>
-              <a:t>13/11/12</a:t>
+              <a:t>14/11/12</a:t>
             </a:fld>
             <a:endParaRPr lang="en-US"/>
           </a:p>
@@ -13735,7 +13917,6 @@
               <a:rPr lang="en-US" dirty="0"/>
               <a:t>)</a:t>
             </a:r>
-            <a:endParaRPr lang="en-US" dirty="0"/>
           </a:p>
         </p:txBody>
       </p:sp>
@@ -13756,7 +13937,7 @@
           <a:p>
             <a:fld id="{971D902E-52E4-5F4D-9A84-F04B09DBA050}" type="datetime1">
               <a:rPr lang="en-SG" smtClean="0"/>
-              <a:t>13/11/12</a:t>
+              <a:t>14/11/12</a:t>
             </a:fld>
             <a:endParaRPr lang="en-US"/>
           </a:p>
@@ -14114,7 +14295,7 @@
           <a:p>
             <a:fld id="{971D902E-52E4-5F4D-9A84-F04B09DBA050}" type="datetime1">
               <a:rPr lang="en-SG" smtClean="0"/>
-              <a:t>13/11/12</a:t>
+              <a:t>14/11/12</a:t>
             </a:fld>
             <a:endParaRPr lang="en-US"/>
           </a:p>
@@ -14300,7 +14481,7 @@
           <a:p>
             <a:fld id="{971D902E-52E4-5F4D-9A84-F04B09DBA050}" type="datetime1">
               <a:rPr lang="en-SG" smtClean="0"/>
-              <a:t>13/11/12</a:t>
+              <a:t>14/11/12</a:t>
             </a:fld>
             <a:endParaRPr lang="en-US"/>
           </a:p>
@@ -14339,6 +14520,13 @@
   <p:clrMapOvr>
     <a:masterClrMapping/>
   </p:clrMapOvr>
+  <p:timing>
+    <p:tnLst>
+      <p:par>
+        <p:cTn xmlns:p14="http://schemas.microsoft.com/office/powerpoint/2010/main" id="1" dur="indefinite" restart="never" nodeType="tmRoot"/>
+      </p:par>
+    </p:tnLst>
+  </p:timing>
 </p:sld>
 </file>
 
@@ -14425,7 +14613,7 @@
           <a:p>
             <a:fld id="{147C69E3-A01A-F547-9575-0A9678504318}" type="datetime1">
               <a:rPr lang="en-SG" smtClean="0"/>
-              <a:t>13/11/12</a:t>
+              <a:t>14/11/12</a:t>
             </a:fld>
             <a:endParaRPr lang="en-US"/>
           </a:p>
@@ -14470,10 +14658,14 @@
           <a:lstStyle/>
           <a:p>
             <a:r>
-              <a:rPr lang="en-US" smtClean="0"/>
-              <a:t>"Introduction to the Special Issue on the Web as Corpus" (Kilgarriff &amp; Grefenstette, 2003)</a:t>
-            </a:r>
-            <a:endParaRPr lang="en-US"/>
+              <a:rPr lang="en-US" dirty="0" err="1" smtClean="0"/>
+              <a:t>Solorio</a:t>
+            </a:r>
+            <a:r>
+              <a:rPr lang="en-US" dirty="0" smtClean="0"/>
+              <a:t> et al, 2004</a:t>
+            </a:r>
+            <a:endParaRPr lang="en-US" dirty="0"/>
           </a:p>
         </p:txBody>
       </p:sp>
@@ -14649,7 +14841,7 @@
           <a:p>
             <a:fld id="{971D902E-52E4-5F4D-9A84-F04B09DBA050}" type="datetime1">
               <a:rPr lang="en-SG" smtClean="0"/>
-              <a:t>13/11/12</a:t>
+              <a:t>14/11/12</a:t>
             </a:fld>
             <a:endParaRPr lang="en-US"/>
           </a:p>
@@ -14688,6 +14880,13 @@
   <p:clrMapOvr>
     <a:masterClrMapping/>
   </p:clrMapOvr>
+  <p:timing>
+    <p:tnLst>
+      <p:par>
+        <p:cTn xmlns:p14="http://schemas.microsoft.com/office/powerpoint/2010/main" id="1" dur="indefinite" restart="never" nodeType="tmRoot"/>
+      </p:par>
+    </p:tnLst>
+  </p:timing>
 </p:sld>
 </file>
 
@@ -14806,7 +15005,7 @@
           <a:p>
             <a:fld id="{971D902E-52E4-5F4D-9A84-F04B09DBA050}" type="datetime1">
               <a:rPr lang="en-SG" smtClean="0"/>
-              <a:t>13/11/12</a:t>
+              <a:t>14/11/12</a:t>
             </a:fld>
             <a:endParaRPr lang="en-US"/>
           </a:p>
@@ -14845,6 +15044,13 @@
   <p:clrMapOvr>
     <a:masterClrMapping/>
   </p:clrMapOvr>
+  <p:timing>
+    <p:tnLst>
+      <p:par>
+        <p:cTn xmlns:p14="http://schemas.microsoft.com/office/powerpoint/2010/main" id="1" dur="indefinite" restart="never" nodeType="tmRoot"/>
+      </p:par>
+    </p:tnLst>
+  </p:timing>
 </p:sld>
 </file>
 
@@ -14924,7 +15130,7 @@
           <a:p>
             <a:fld id="{971D902E-52E4-5F4D-9A84-F04B09DBA050}" type="datetime1">
               <a:rPr lang="en-SG" smtClean="0"/>
-              <a:t>13/11/12</a:t>
+              <a:t>14/11/12</a:t>
             </a:fld>
             <a:endParaRPr lang="en-US"/>
           </a:p>
@@ -14963,6 +15169,13 @@
   <p:clrMapOvr>
     <a:masterClrMapping/>
   </p:clrMapOvr>
+  <p:timing>
+    <p:tnLst>
+      <p:par>
+        <p:cTn xmlns:p14="http://schemas.microsoft.com/office/powerpoint/2010/main" id="1" dur="indefinite" restart="never" nodeType="tmRoot"/>
+      </p:par>
+    </p:tnLst>
+  </p:timing>
 </p:sld>
 </file>
 
@@ -15051,7 +15264,21 @@
             </a:pPr>
             <a:r>
               <a:rPr lang="en-US" dirty="0" smtClean="0"/>
-              <a:t>Maximize instances for training</a:t>
+              <a:t>Maximize instances for </a:t>
+            </a:r>
+            <a:r>
+              <a:rPr lang="en-US" dirty="0" smtClean="0"/>
+              <a:t>training</a:t>
+            </a:r>
+          </a:p>
+          <a:p>
+            <a:pPr lvl="1">
+              <a:buFont typeface="Arial"/>
+              <a:buChar char="•"/>
+            </a:pPr>
+            <a:r>
+              <a:rPr lang="en-US" dirty="0" smtClean="0"/>
+              <a:t>Balanced performance</a:t>
             </a:r>
             <a:endParaRPr lang="en-US" dirty="0"/>
           </a:p>
@@ -15074,7 +15301,7 @@
           <a:p>
             <a:fld id="{971D902E-52E4-5F4D-9A84-F04B09DBA050}" type="datetime1">
               <a:rPr lang="en-SG" smtClean="0"/>
-              <a:t>13/11/12</a:t>
+              <a:t>14/11/12</a:t>
             </a:fld>
             <a:endParaRPr lang="en-US"/>
           </a:p>
@@ -15125,7 +15352,7 @@
         </p:blipFill>
         <p:spPr>
           <a:xfrm>
-            <a:off x="685800" y="3352800"/>
+            <a:off x="812800" y="3686175"/>
             <a:ext cx="7553325" cy="2304791"/>
           </a:xfrm>
           <a:prstGeom prst="rect">
@@ -15143,6 +15370,13 @@
   <p:clrMapOvr>
     <a:masterClrMapping/>
   </p:clrMapOvr>
+  <p:timing>
+    <p:tnLst>
+      <p:par>
+        <p:cTn xmlns:p14="http://schemas.microsoft.com/office/powerpoint/2010/main" id="1" dur="indefinite" restart="never" nodeType="tmRoot"/>
+      </p:par>
+    </p:tnLst>
+  </p:timing>
 </p:sld>
 </file>
 
@@ -15215,7 +15449,7 @@
         </p:blipFill>
         <p:spPr>
           <a:xfrm>
-            <a:off x="685800" y="1059516"/>
+            <a:off x="701675" y="1567516"/>
             <a:ext cx="7770813" cy="4257022"/>
           </a:xfrm>
         </p:spPr>
@@ -15237,7 +15471,7 @@
           <a:p>
             <a:fld id="{971D902E-52E4-5F4D-9A84-F04B09DBA050}" type="datetime1">
               <a:rPr lang="en-SG" smtClean="0"/>
-              <a:t>13/11/12</a:t>
+              <a:t>14/11/12</a:t>
             </a:fld>
             <a:endParaRPr lang="en-US"/>
           </a:p>
@@ -15276,6 +15510,13 @@
   <p:clrMapOvr>
     <a:masterClrMapping/>
   </p:clrMapOvr>
+  <p:timing>
+    <p:tnLst>
+      <p:par>
+        <p:cTn xmlns:p14="http://schemas.microsoft.com/office/powerpoint/2010/main" id="1" dur="indefinite" restart="never" nodeType="tmRoot"/>
+      </p:par>
+    </p:tnLst>
+  </p:timing>
 </p:sld>
 </file>
 
@@ -15397,7 +15638,7 @@
           <a:p>
             <a:fld id="{971D902E-52E4-5F4D-9A84-F04B09DBA050}" type="datetime1">
               <a:rPr lang="en-SG" smtClean="0"/>
-              <a:t>13/11/12</a:t>
+              <a:t>14/11/12</a:t>
             </a:fld>
             <a:endParaRPr lang="en-US"/>
           </a:p>
@@ -15448,7 +15689,7 @@
         </p:blipFill>
         <p:spPr>
           <a:xfrm>
-            <a:off x="1182688" y="3683000"/>
+            <a:off x="1182688" y="3746500"/>
             <a:ext cx="7057644" cy="2673350"/>
           </a:xfrm>
           <a:prstGeom prst="rect">
@@ -15466,6 +15707,13 @@
   <p:clrMapOvr>
     <a:masterClrMapping/>
   </p:clrMapOvr>
+  <p:timing>
+    <p:tnLst>
+      <p:par>
+        <p:cTn xmlns:p14="http://schemas.microsoft.com/office/powerpoint/2010/main" id="1" dur="indefinite" restart="never" nodeType="tmRoot"/>
+      </p:par>
+    </p:tnLst>
+  </p:timing>
 </p:sld>
 </file>
 
@@ -15523,7 +15771,12 @@
             <p:ph idx="1"/>
           </p:nvPr>
         </p:nvSpPr>
-        <p:spPr/>
+        <p:spPr>
+          <a:xfrm>
+            <a:off x="685800" y="1250016"/>
+            <a:ext cx="7770813" cy="4257022"/>
+          </a:xfrm>
+        </p:spPr>
         <p:txBody>
           <a:bodyPr/>
           <a:lstStyle/>
@@ -15557,7 +15810,7 @@
           <a:p>
             <a:fld id="{971D902E-52E4-5F4D-9A84-F04B09DBA050}" type="datetime1">
               <a:rPr lang="en-SG" smtClean="0"/>
-              <a:t>13/11/12</a:t>
+              <a:t>14/11/12</a:t>
             </a:fld>
             <a:endParaRPr lang="en-US"/>
           </a:p>
@@ -15608,7 +15861,7 @@
         </p:blipFill>
         <p:spPr>
           <a:xfrm>
-            <a:off x="685800" y="2316163"/>
+            <a:off x="765175" y="1760538"/>
             <a:ext cx="7658100" cy="3810000"/>
           </a:xfrm>
           <a:prstGeom prst="rect">
@@ -15616,6 +15869,59 @@
           </a:prstGeom>
         </p:spPr>
       </p:pic>
+      <p:sp>
+        <p:nvSpPr>
+          <p:cNvPr id="7" name="TextBox 6"/>
+          <p:cNvSpPr txBox="1"/>
+          <p:nvPr/>
+        </p:nvSpPr>
+        <p:spPr>
+          <a:xfrm>
+            <a:off x="523875" y="5651500"/>
+            <a:ext cx="8104540" cy="646331"/>
+          </a:xfrm>
+          <a:prstGeom prst="rect">
+            <a:avLst/>
+          </a:prstGeom>
+          <a:noFill/>
+        </p:spPr>
+        <p:txBody>
+          <a:bodyPr wrap="none" rtlCol="0">
+            <a:spAutoFit/>
+          </a:bodyPr>
+          <a:lstStyle/>
+          <a:p>
+            <a:r>
+              <a:rPr lang="en-US" dirty="0" smtClean="0"/>
+              <a:t>A – Physical Feature; B – Number Density; C – Published Year; D – </a:t>
+            </a:r>
+            <a:r>
+              <a:rPr lang="en-US" dirty="0" err="1" smtClean="0"/>
+              <a:t>Avg</a:t>
+            </a:r>
+            <a:r>
+              <a:rPr lang="en-US" dirty="0" smtClean="0"/>
+              <a:t> </a:t>
+            </a:r>
+            <a:r>
+              <a:rPr lang="en-US" dirty="0" err="1" smtClean="0"/>
+              <a:t>TFxIDF</a:t>
+            </a:r>
+            <a:r>
+              <a:rPr lang="en-US" dirty="0"/>
+              <a:t/>
+            </a:r>
+            <a:br>
+              <a:rPr lang="en-US" dirty="0"/>
+            </a:br>
+            <a:r>
+              <a:rPr lang="en-US" dirty="0" smtClean="0"/>
+              <a:t>E – Cue Words</a:t>
+            </a:r>
+            <a:endParaRPr lang="en-US" dirty="0"/>
+          </a:p>
+        </p:txBody>
+      </p:sp>
     </p:spTree>
     <p:extLst>
       <p:ext uri="{BB962C8B-B14F-4D97-AF65-F5344CB8AC3E}">
@@ -15626,6 +15932,13 @@
   <p:clrMapOvr>
     <a:masterClrMapping/>
   </p:clrMapOvr>
+  <p:timing>
+    <p:tnLst>
+      <p:par>
+        <p:cTn xmlns:p14="http://schemas.microsoft.com/office/powerpoint/2010/main" id="1" dur="indefinite" restart="never" nodeType="tmRoot"/>
+      </p:par>
+    </p:tnLst>
+  </p:timing>
 </p:sld>
 </file>
 
@@ -15694,7 +16007,21 @@
             </a:pPr>
             <a:r>
               <a:rPr lang="en-US" dirty="0" smtClean="0"/>
-              <a:t>Leave-One-Out</a:t>
+              <a:t>Leave-One-</a:t>
+            </a:r>
+            <a:r>
+              <a:rPr lang="en-US" dirty="0" smtClean="0"/>
+              <a:t>Out</a:t>
+            </a:r>
+          </a:p>
+          <a:p>
+            <a:pPr>
+              <a:buFont typeface="Arial"/>
+              <a:buChar char="•"/>
+            </a:pPr>
+            <a:r>
+              <a:rPr lang="en-US" dirty="0" smtClean="0"/>
+              <a:t>Balanced performance</a:t>
             </a:r>
             <a:endParaRPr lang="en-US" dirty="0"/>
           </a:p>
@@ -15717,7 +16044,7 @@
           <a:p>
             <a:fld id="{971D902E-52E4-5F4D-9A84-F04B09DBA050}" type="datetime1">
               <a:rPr lang="en-SG" smtClean="0"/>
-              <a:t>13/11/12</a:t>
+              <a:t>14/11/12</a:t>
             </a:fld>
             <a:endParaRPr lang="en-US"/>
           </a:p>
@@ -15768,7 +16095,7 @@
         </p:blipFill>
         <p:spPr>
           <a:xfrm>
-            <a:off x="428625" y="2527300"/>
+            <a:off x="476250" y="3305175"/>
             <a:ext cx="8153400" cy="2501900"/>
           </a:xfrm>
           <a:prstGeom prst="rect">
@@ -15786,6 +16113,13 @@
   <p:clrMapOvr>
     <a:masterClrMapping/>
   </p:clrMapOvr>
+  <p:timing>
+    <p:tnLst>
+      <p:par>
+        <p:cTn xmlns:p14="http://schemas.microsoft.com/office/powerpoint/2010/main" id="1" dur="indefinite" restart="never" nodeType="tmRoot"/>
+      </p:par>
+    </p:tnLst>
+  </p:timing>
 </p:sld>
 </file>
 
@@ -15875,7 +16209,7 @@
           <a:p>
             <a:fld id="{971D902E-52E4-5F4D-9A84-F04B09DBA050}" type="datetime1">
               <a:rPr lang="en-SG" smtClean="0"/>
-              <a:t>13/11/12</a:t>
+              <a:t>14/11/12</a:t>
             </a:fld>
             <a:endParaRPr lang="en-US"/>
           </a:p>
@@ -15914,6 +16248,13 @@
   <p:clrMapOvr>
     <a:masterClrMapping/>
   </p:clrMapOvr>
+  <p:timing>
+    <p:tnLst>
+      <p:par>
+        <p:cTn xmlns:p14="http://schemas.microsoft.com/office/powerpoint/2010/main" id="1" dur="indefinite" restart="never" nodeType="tmRoot"/>
+      </p:par>
+    </p:tnLst>
+  </p:timing>
 </p:sld>
 </file>
 
@@ -16005,7 +16346,7 @@
           <a:p>
             <a:fld id="{971D902E-52E4-5F4D-9A84-F04B09DBA050}" type="datetime1">
               <a:rPr lang="en-SG" smtClean="0"/>
-              <a:t>13/11/12</a:t>
+              <a:t>14/11/12</a:t>
             </a:fld>
             <a:endParaRPr lang="en-US"/>
           </a:p>
@@ -16056,7 +16397,7 @@
         </p:blipFill>
         <p:spPr>
           <a:xfrm>
-            <a:off x="685800" y="2584450"/>
+            <a:off x="733425" y="2473325"/>
             <a:ext cx="7721600" cy="3276600"/>
           </a:xfrm>
           <a:prstGeom prst="rect">
@@ -16064,6 +16405,40 @@
           </a:prstGeom>
         </p:spPr>
       </p:pic>
+      <p:sp>
+        <p:nvSpPr>
+          <p:cNvPr id="7" name="TextBox 6"/>
+          <p:cNvSpPr txBox="1"/>
+          <p:nvPr/>
+        </p:nvSpPr>
+        <p:spPr>
+          <a:xfrm>
+            <a:off x="781050" y="5873750"/>
+            <a:ext cx="7561159" cy="369332"/>
+          </a:xfrm>
+          <a:prstGeom prst="rect">
+            <a:avLst/>
+          </a:prstGeom>
+          <a:noFill/>
+        </p:spPr>
+        <p:txBody>
+          <a:bodyPr wrap="none" rtlCol="0">
+            <a:spAutoFit/>
+          </a:bodyPr>
+          <a:lstStyle/>
+          <a:p>
+            <a:r>
+              <a:rPr lang="en-US" dirty="0" smtClean="0"/>
+              <a:t>F – Surface Matching; G – Number Near-Miss; H – Bigram; I – Cosine </a:t>
+            </a:r>
+            <a:r>
+              <a:rPr lang="en-US" dirty="0" err="1" smtClean="0"/>
+              <a:t>Sim</a:t>
+            </a:r>
+            <a:endParaRPr lang="en-US" dirty="0"/>
+          </a:p>
+        </p:txBody>
+      </p:sp>
     </p:spTree>
     <p:extLst>
       <p:ext uri="{BB962C8B-B14F-4D97-AF65-F5344CB8AC3E}">
@@ -16074,6 +16449,13 @@
   <p:clrMapOvr>
     <a:masterClrMapping/>
   </p:clrMapOvr>
+  <p:timing>
+    <p:tnLst>
+      <p:par>
+        <p:cTn xmlns:p14="http://schemas.microsoft.com/office/powerpoint/2010/main" id="1" dur="indefinite" restart="never" nodeType="tmRoot"/>
+      </p:par>
+    </p:tnLst>
+  </p:timing>
 </p:sld>
 </file>
 
@@ -16159,7 +16541,7 @@
           <a:p>
             <a:fld id="{971D902E-52E4-5F4D-9A84-F04B09DBA050}" type="datetime1">
               <a:rPr lang="en-SG" smtClean="0"/>
-              <a:t>13/11/12</a:t>
+              <a:t>14/11/12</a:t>
             </a:fld>
             <a:endParaRPr lang="en-US"/>
           </a:p>
@@ -16252,15 +16634,138 @@
           </a:p>
         </p:txBody>
       </p:sp>
+      <p:sp>
+        <p:nvSpPr>
+          <p:cNvPr id="4" name="Date Placeholder 3"/>
+          <p:cNvSpPr>
+            <a:spLocks noGrp="1"/>
+          </p:cNvSpPr>
+          <p:nvPr>
+            <p:ph type="dt" sz="half" idx="10"/>
+          </p:nvPr>
+        </p:nvSpPr>
+        <p:spPr/>
+        <p:txBody>
+          <a:bodyPr/>
+          <a:lstStyle/>
+          <a:p>
+            <a:fld id="{971D902E-52E4-5F4D-9A84-F04B09DBA050}" type="datetime1">
+              <a:rPr lang="en-SG" smtClean="0"/>
+              <a:t>14/11/12</a:t>
+            </a:fld>
+            <a:endParaRPr lang="en-US"/>
+          </a:p>
+        </p:txBody>
+      </p:sp>
+      <p:sp>
+        <p:nvSpPr>
+          <p:cNvPr id="5" name="Slide Number Placeholder 4"/>
+          <p:cNvSpPr>
+            <a:spLocks noGrp="1"/>
+          </p:cNvSpPr>
+          <p:nvPr>
+            <p:ph type="sldNum" sz="quarter" idx="12"/>
+          </p:nvPr>
+        </p:nvSpPr>
+        <p:spPr/>
+        <p:txBody>
+          <a:bodyPr/>
+          <a:lstStyle/>
+          <a:p>
+            <a:fld id="{9C1F5A0A-F6FC-4FFD-9B49-0DA8697211D9}" type="slidenum">
+              <a:rPr lang="en-US" smtClean="0"/>
+              <a:t>60</a:t>
+            </a:fld>
+            <a:endParaRPr lang="en-US"/>
+          </a:p>
+        </p:txBody>
+      </p:sp>
+      <p:sp>
+        <p:nvSpPr>
+          <p:cNvPr id="3" name="Content Placeholder 2"/>
+          <p:cNvSpPr>
+            <a:spLocks noGrp="1"/>
+          </p:cNvSpPr>
+          <p:nvPr>
+            <p:ph idx="1"/>
+          </p:nvPr>
+        </p:nvSpPr>
+        <p:spPr/>
+        <p:txBody>
+          <a:bodyPr/>
+          <a:lstStyle/>
+          <a:p>
+            <a:pPr>
+              <a:buFont typeface="Arial"/>
+              <a:buChar char="•"/>
+            </a:pPr>
+            <a:r>
+              <a:rPr lang="en-US" dirty="0" smtClean="0"/>
+              <a:t>Compare with a baseline</a:t>
+            </a:r>
+          </a:p>
+          <a:p>
+            <a:pPr lvl="1">
+              <a:buFont typeface="Arial"/>
+              <a:buChar char="•"/>
+            </a:pPr>
+            <a:r>
+              <a:rPr lang="en-US" dirty="0" smtClean="0"/>
+              <a:t>Baseline: Only Cosine </a:t>
+            </a:r>
+            <a:r>
+              <a:rPr lang="en-US" dirty="0" err="1" smtClean="0"/>
+              <a:t>Sim</a:t>
+            </a:r>
+            <a:r>
+              <a:rPr lang="en-US" dirty="0" smtClean="0"/>
+              <a:t> (Feature I)</a:t>
+            </a:r>
+          </a:p>
+          <a:p>
+            <a:pPr lvl="1">
+              <a:buFont typeface="Arial"/>
+              <a:buChar char="•"/>
+            </a:pPr>
+            <a:r>
+              <a:rPr lang="en-US" dirty="0" smtClean="0"/>
+              <a:t>Sampled an </a:t>
+            </a:r>
+            <a:r>
+              <a:rPr lang="en-US" dirty="0" err="1" smtClean="0"/>
+              <a:t>unskewed</a:t>
+            </a:r>
+            <a:r>
+              <a:rPr lang="en-US" dirty="0" smtClean="0"/>
+              <a:t> dataset</a:t>
+            </a:r>
+          </a:p>
+          <a:p>
+            <a:pPr lvl="1">
+              <a:buFont typeface="Arial"/>
+              <a:buChar char="•"/>
+            </a:pPr>
+            <a:r>
+              <a:rPr lang="en-US" dirty="0" smtClean="0"/>
+              <a:t>Train on 75%, Test on 25%</a:t>
+            </a:r>
+          </a:p>
+          <a:p>
+            <a:pPr lvl="1">
+              <a:buFont typeface="Arial"/>
+              <a:buChar char="•"/>
+            </a:pPr>
+            <a:endParaRPr lang="en-US" dirty="0"/>
+          </a:p>
+        </p:txBody>
+      </p:sp>
       <p:pic>
         <p:nvPicPr>
-          <p:cNvPr id="6" name="Content Placeholder 5" descr="Screen Shot 2012-11-13 at 5.15.18 PM.PNG"/>
+          <p:cNvPr id="7" name="Content Placeholder 5" descr="Screen Shot 2012-11-13 at 5.15.18 PM.PNG"/>
           <p:cNvPicPr>
-            <a:picLocks noGrp="1" noChangeAspect="1"/>
+            <a:picLocks noChangeAspect="1"/>
           </p:cNvPicPr>
-          <p:nvPr>
-            <p:ph idx="1"/>
-          </p:nvPr>
+          <p:nvPr/>
         </p:nvPicPr>
         <p:blipFill>
           <a:blip r:embed="rId2">
@@ -16275,54 +16780,16 @@
             <a:fillRect/>
           </a:stretch>
         </p:blipFill>
-        <p:spPr/>
+        <p:spPr>
+          <a:xfrm>
+            <a:off x="872097" y="2766078"/>
+            <a:ext cx="7770813" cy="4257022"/>
+          </a:xfrm>
+          <a:prstGeom prst="rect">
+            <a:avLst/>
+          </a:prstGeom>
+        </p:spPr>
       </p:pic>
-      <p:sp>
-        <p:nvSpPr>
-          <p:cNvPr id="4" name="Date Placeholder 3"/>
-          <p:cNvSpPr>
-            <a:spLocks noGrp="1"/>
-          </p:cNvSpPr>
-          <p:nvPr>
-            <p:ph type="dt" sz="half" idx="10"/>
-          </p:nvPr>
-        </p:nvSpPr>
-        <p:spPr/>
-        <p:txBody>
-          <a:bodyPr/>
-          <a:lstStyle/>
-          <a:p>
-            <a:fld id="{971D902E-52E4-5F4D-9A84-F04B09DBA050}" type="datetime1">
-              <a:rPr lang="en-SG" smtClean="0"/>
-              <a:t>13/11/12</a:t>
-            </a:fld>
-            <a:endParaRPr lang="en-US"/>
-          </a:p>
-        </p:txBody>
-      </p:sp>
-      <p:sp>
-        <p:nvSpPr>
-          <p:cNvPr id="5" name="Slide Number Placeholder 4"/>
-          <p:cNvSpPr>
-            <a:spLocks noGrp="1"/>
-          </p:cNvSpPr>
-          <p:nvPr>
-            <p:ph type="sldNum" sz="quarter" idx="12"/>
-          </p:nvPr>
-        </p:nvSpPr>
-        <p:spPr/>
-        <p:txBody>
-          <a:bodyPr/>
-          <a:lstStyle/>
-          <a:p>
-            <a:fld id="{9C1F5A0A-F6FC-4FFD-9B49-0DA8697211D9}" type="slidenum">
-              <a:rPr lang="en-US" smtClean="0"/>
-              <a:t>60</a:t>
-            </a:fld>
-            <a:endParaRPr lang="en-US"/>
-          </a:p>
-        </p:txBody>
-      </p:sp>
     </p:spTree>
     <p:extLst>
       <p:ext uri="{BB962C8B-B14F-4D97-AF65-F5344CB8AC3E}">
@@ -16333,6 +16800,13 @@
   <p:clrMapOvr>
     <a:masterClrMapping/>
   </p:clrMapOvr>
+  <p:timing>
+    <p:tnLst>
+      <p:par>
+        <p:cTn xmlns:p14="http://schemas.microsoft.com/office/powerpoint/2010/main" id="1" dur="indefinite" restart="never" nodeType="tmRoot"/>
+      </p:par>
+    </p:tnLst>
+  </p:timing>
 </p:sld>
 </file>
 
@@ -16459,7 +16933,6 @@
               <a:rPr lang="en-US" dirty="0" smtClean="0"/>
               <a:t>A combination of 2 mechanisms: Citation Classification and Search</a:t>
             </a:r>
-            <a:endParaRPr lang="en-US" dirty="0" smtClean="0"/>
           </a:p>
           <a:p>
             <a:pPr>
@@ -16478,11 +16951,7 @@
             </a:pPr>
             <a:r>
               <a:rPr lang="en-US" dirty="0" smtClean="0"/>
-              <a:t>Yes. </a:t>
-            </a:r>
-            <a:r>
-              <a:rPr lang="en-US" dirty="0" smtClean="0"/>
-              <a:t>An important reading tool to understand and navigate between papers</a:t>
+              <a:t>Yes. An important reading tool to understand and navigate between papers</a:t>
             </a:r>
           </a:p>
           <a:p>
@@ -16523,7 +16992,7 @@
           <a:p>
             <a:fld id="{971D902E-52E4-5F4D-9A84-F04B09DBA050}" type="datetime1">
               <a:rPr lang="en-SG" smtClean="0"/>
-              <a:t>13/11/12</a:t>
+              <a:t>14/11/12</a:t>
             </a:fld>
             <a:endParaRPr lang="en-US"/>
           </a:p>
@@ -16562,6 +17031,13 @@
   <p:clrMapOvr>
     <a:masterClrMapping/>
   </p:clrMapOvr>
+  <p:timing>
+    <p:tnLst>
+      <p:par>
+        <p:cTn xmlns:p14="http://schemas.microsoft.com/office/powerpoint/2010/main" id="1" dur="indefinite" restart="never" nodeType="tmRoot"/>
+      </p:par>
+    </p:tnLst>
+  </p:timing>
 </p:sld>
 </file>
 
@@ -16756,7 +17232,7 @@
           <a:p>
             <a:fld id="{971D902E-52E4-5F4D-9A84-F04B09DBA050}" type="datetime1">
               <a:rPr lang="en-SG" smtClean="0"/>
-              <a:t>13/11/12</a:t>
+              <a:t>14/11/12</a:t>
             </a:fld>
             <a:endParaRPr lang="en-US"/>
           </a:p>
@@ -16795,6 +17271,13 @@
   <p:clrMapOvr>
     <a:masterClrMapping/>
   </p:clrMapOvr>
+  <p:timing>
+    <p:tnLst>
+      <p:par>
+        <p:cTn xmlns:p14="http://schemas.microsoft.com/office/powerpoint/2010/main" id="1" dur="indefinite" restart="never" nodeType="tmRoot"/>
+      </p:par>
+    </p:tnLst>
+  </p:timing>
 </p:sld>
 </file>
 
@@ -16874,7 +17357,7 @@
           <a:p>
             <a:fld id="{971D902E-52E4-5F4D-9A84-F04B09DBA050}" type="datetime1">
               <a:rPr lang="en-SG" smtClean="0"/>
-              <a:t>13/11/12</a:t>
+              <a:t>14/11/12</a:t>
             </a:fld>
             <a:endParaRPr lang="en-US"/>
           </a:p>
@@ -16913,6 +17396,13 @@
   <p:clrMapOvr>
     <a:masterClrMapping/>
   </p:clrMapOvr>
+  <p:timing>
+    <p:tnLst>
+      <p:par>
+        <p:cTn xmlns:p14="http://schemas.microsoft.com/office/powerpoint/2010/main" id="1" dur="indefinite" restart="never" nodeType="tmRoot"/>
+      </p:par>
+    </p:tnLst>
+  </p:timing>
 </p:sld>
 </file>
 
@@ -16995,7 +17485,7 @@
           <a:p>
             <a:fld id="{10B0BBCE-74AF-BE4E-A2F5-5D2EAE0452E8}" type="datetime1">
               <a:rPr lang="en-SG" smtClean="0"/>
-              <a:t>13/11/12</a:t>
+              <a:t>14/11/12</a:t>
             </a:fld>
             <a:endParaRPr lang="en-US"/>
           </a:p>
@@ -17123,7 +17613,7 @@
           <a:p>
             <a:fld id="{10B0BBCE-74AF-BE4E-A2F5-5D2EAE0452E8}" type="datetime1">
               <a:rPr lang="en-SG" smtClean="0"/>
-              <a:t>13/11/12</a:t>
+              <a:t>14/11/12</a:t>
             </a:fld>
             <a:endParaRPr lang="en-US"/>
           </a:p>
@@ -17308,7 +17798,7 @@
           <a:p>
             <a:fld id="{10B0BBCE-74AF-BE4E-A2F5-5D2EAE0452E8}" type="datetime1">
               <a:rPr lang="en-SG" smtClean="0"/>
-              <a:t>13/11/12</a:t>
+              <a:t>14/11/12</a:t>
             </a:fld>
             <a:endParaRPr lang="en-US"/>
           </a:p>

</xml_diff>